<commit_message>
Week 5 plus stuff
</commit_message>
<xml_diff>
--- a/in_class_slides/geog4300_W05-1 Point pattern analysis and MAUP.pptx
+++ b/in_class_slides/geog4300_W05-1 Point pattern analysis and MAUP.pptx
@@ -5,18 +5,19 @@
     <p:sldMasterId id="2147483660" r:id="rId1"/>
   </p:sldMasterIdLst>
   <p:notesMasterIdLst>
-    <p:notesMasterId r:id="rId11"/>
+    <p:notesMasterId r:id="rId12"/>
   </p:notesMasterIdLst>
   <p:sldIdLst>
     <p:sldId id="256" r:id="rId2"/>
     <p:sldId id="257" r:id="rId3"/>
     <p:sldId id="283" r:id="rId4"/>
     <p:sldId id="284" r:id="rId5"/>
-    <p:sldId id="285" r:id="rId6"/>
-    <p:sldId id="286" r:id="rId7"/>
-    <p:sldId id="289" r:id="rId8"/>
-    <p:sldId id="287" r:id="rId9"/>
-    <p:sldId id="288" r:id="rId10"/>
+    <p:sldId id="290" r:id="rId6"/>
+    <p:sldId id="285" r:id="rId7"/>
+    <p:sldId id="286" r:id="rId8"/>
+    <p:sldId id="289" r:id="rId9"/>
+    <p:sldId id="287" r:id="rId10"/>
+    <p:sldId id="288" r:id="rId11"/>
   </p:sldIdLst>
   <p:sldSz cx="12192000" cy="6858000"/>
   <p:notesSz cx="6858000" cy="9144000"/>
@@ -205,7 +206,7 @@
           <a:p>
             <a:fld id="{F1C23026-85D4-48E8-9219-18000F688023}" type="datetimeFigureOut">
               <a:rPr lang="en-US" smtClean="0"/>
-              <a:t>9/20/2022</a:t>
+              <a:t>9/15/2023</a:t>
             </a:fld>
             <a:endParaRPr lang="en-US"/>
           </a:p>
@@ -657,7 +658,7 @@
           <a:p>
             <a:fld id="{93C8B963-0F36-48FC-991E-AA63861DA924}" type="datetimeFigureOut">
               <a:rPr lang="en-US" smtClean="0"/>
-              <a:t>9/20/2022</a:t>
+              <a:t>9/15/2023</a:t>
             </a:fld>
             <a:endParaRPr lang="en-US"/>
           </a:p>
@@ -955,7 +956,7 @@
           <a:p>
             <a:fld id="{93C8B963-0F36-48FC-991E-AA63861DA924}" type="datetimeFigureOut">
               <a:rPr lang="en-US" smtClean="0"/>
-              <a:t>9/20/2022</a:t>
+              <a:t>9/15/2023</a:t>
             </a:fld>
             <a:endParaRPr lang="en-US"/>
           </a:p>
@@ -1147,7 +1148,7 @@
           <a:p>
             <a:fld id="{93C8B963-0F36-48FC-991E-AA63861DA924}" type="datetimeFigureOut">
               <a:rPr lang="en-US" smtClean="0"/>
-              <a:t>9/20/2022</a:t>
+              <a:t>9/15/2023</a:t>
             </a:fld>
             <a:endParaRPr lang="en-US"/>
           </a:p>
@@ -1408,7 +1409,7 @@
           <a:p>
             <a:fld id="{93C8B963-0F36-48FC-991E-AA63861DA924}" type="datetimeFigureOut">
               <a:rPr lang="en-US" smtClean="0"/>
-              <a:t>9/20/2022</a:t>
+              <a:t>9/15/2023</a:t>
             </a:fld>
             <a:endParaRPr lang="en-US"/>
           </a:p>
@@ -1832,7 +1833,7 @@
           <a:p>
             <a:fld id="{93C8B963-0F36-48FC-991E-AA63861DA924}" type="datetimeFigureOut">
               <a:rPr lang="en-US" smtClean="0"/>
-              <a:t>9/20/2022</a:t>
+              <a:t>9/15/2023</a:t>
             </a:fld>
             <a:endParaRPr lang="en-US"/>
           </a:p>
@@ -2369,7 +2370,7 @@
           <a:p>
             <a:fld id="{93C8B963-0F36-48FC-991E-AA63861DA924}" type="datetimeFigureOut">
               <a:rPr lang="en-US" smtClean="0"/>
-              <a:t>9/20/2022</a:t>
+              <a:t>9/15/2023</a:t>
             </a:fld>
             <a:endParaRPr lang="en-US"/>
           </a:p>
@@ -3233,7 +3234,7 @@
           <a:p>
             <a:fld id="{93C8B963-0F36-48FC-991E-AA63861DA924}" type="datetimeFigureOut">
               <a:rPr lang="en-US" smtClean="0"/>
-              <a:t>9/20/2022</a:t>
+              <a:t>9/15/2023</a:t>
             </a:fld>
             <a:endParaRPr lang="en-US"/>
           </a:p>
@@ -3403,7 +3404,7 @@
           <a:p>
             <a:fld id="{93C8B963-0F36-48FC-991E-AA63861DA924}" type="datetimeFigureOut">
               <a:rPr lang="en-US" smtClean="0"/>
-              <a:t>9/20/2022</a:t>
+              <a:t>9/15/2023</a:t>
             </a:fld>
             <a:endParaRPr lang="en-US"/>
           </a:p>
@@ -3587,7 +3588,7 @@
           <a:p>
             <a:fld id="{93C8B963-0F36-48FC-991E-AA63861DA924}" type="datetimeFigureOut">
               <a:rPr lang="en-US" smtClean="0"/>
-              <a:t>9/20/2022</a:t>
+              <a:t>9/15/2023</a:t>
             </a:fld>
             <a:endParaRPr lang="en-US"/>
           </a:p>
@@ -3757,7 +3758,7 @@
           <a:p>
             <a:fld id="{93C8B963-0F36-48FC-991E-AA63861DA924}" type="datetimeFigureOut">
               <a:rPr lang="en-US" smtClean="0"/>
-              <a:t>9/20/2022</a:t>
+              <a:t>9/15/2023</a:t>
             </a:fld>
             <a:endParaRPr lang="en-US"/>
           </a:p>
@@ -4001,7 +4002,7 @@
           <a:p>
             <a:fld id="{93C8B963-0F36-48FC-991E-AA63861DA924}" type="datetimeFigureOut">
               <a:rPr lang="en-US" smtClean="0"/>
-              <a:t>9/20/2022</a:t>
+              <a:t>9/15/2023</a:t>
             </a:fld>
             <a:endParaRPr lang="en-US"/>
           </a:p>
@@ -4237,7 +4238,7 @@
           <a:p>
             <a:fld id="{93C8B963-0F36-48FC-991E-AA63861DA924}" type="datetimeFigureOut">
               <a:rPr lang="en-US" smtClean="0"/>
-              <a:t>9/20/2022</a:t>
+              <a:t>9/15/2023</a:t>
             </a:fld>
             <a:endParaRPr lang="en-US"/>
           </a:p>
@@ -4703,7 +4704,7 @@
           <a:p>
             <a:fld id="{93C8B963-0F36-48FC-991E-AA63861DA924}" type="datetimeFigureOut">
               <a:rPr lang="en-US" smtClean="0"/>
-              <a:t>9/20/2022</a:t>
+              <a:t>9/15/2023</a:t>
             </a:fld>
             <a:endParaRPr lang="en-US"/>
           </a:p>
@@ -4821,7 +4822,7 @@
           <a:p>
             <a:fld id="{93C8B963-0F36-48FC-991E-AA63861DA924}" type="datetimeFigureOut">
               <a:rPr lang="en-US" smtClean="0"/>
-              <a:t>9/20/2022</a:t>
+              <a:t>9/15/2023</a:t>
             </a:fld>
             <a:endParaRPr lang="en-US"/>
           </a:p>
@@ -4916,7 +4917,7 @@
           <a:p>
             <a:fld id="{93C8B963-0F36-48FC-991E-AA63861DA924}" type="datetimeFigureOut">
               <a:rPr lang="en-US" smtClean="0"/>
-              <a:t>9/20/2022</a:t>
+              <a:t>9/15/2023</a:t>
             </a:fld>
             <a:endParaRPr lang="en-US"/>
           </a:p>
@@ -5171,7 +5172,7 @@
           <a:p>
             <a:fld id="{93C8B963-0F36-48FC-991E-AA63861DA924}" type="datetimeFigureOut">
               <a:rPr lang="en-US" smtClean="0"/>
-              <a:t>9/20/2022</a:t>
+              <a:t>9/15/2023</a:t>
             </a:fld>
             <a:endParaRPr lang="en-US"/>
           </a:p>
@@ -5471,7 +5472,7 @@
           <a:p>
             <a:fld id="{93C8B963-0F36-48FC-991E-AA63861DA924}" type="datetimeFigureOut">
               <a:rPr lang="en-US" smtClean="0"/>
-              <a:t>9/20/2022</a:t>
+              <a:t>9/15/2023</a:t>
             </a:fld>
             <a:endParaRPr lang="en-US"/>
           </a:p>
@@ -5705,7 +5706,7 @@
           <a:p>
             <a:fld id="{93C8B963-0F36-48FC-991E-AA63861DA924}" type="datetimeFigureOut">
               <a:rPr lang="en-US" smtClean="0"/>
-              <a:t>9/20/2022</a:t>
+              <a:t>9/15/2023</a:t>
             </a:fld>
             <a:endParaRPr lang="en-US"/>
           </a:p>
@@ -6492,6 +6493,174 @@
 </p:sld>
 </file>
 
+<file path=ppt/slides/slide10.xml><?xml version="1.0" encoding="utf-8"?>
+<p:sld xmlns:a="http://schemas.openxmlformats.org/drawingml/2006/main" xmlns:r="http://schemas.openxmlformats.org/officeDocument/2006/relationships" xmlns:p="http://schemas.openxmlformats.org/presentationml/2006/main">
+  <p:cSld>
+    <p:spTree>
+      <p:nvGrpSpPr>
+        <p:cNvPr id="1" name=""/>
+        <p:cNvGrpSpPr/>
+        <p:nvPr/>
+      </p:nvGrpSpPr>
+      <p:grpSpPr>
+        <a:xfrm>
+          <a:off x="0" y="0"/>
+          <a:ext cx="0" cy="0"/>
+          <a:chOff x="0" y="0"/>
+          <a:chExt cx="0" cy="0"/>
+        </a:xfrm>
+      </p:grpSpPr>
+      <p:sp>
+        <p:nvSpPr>
+          <p:cNvPr id="6" name="TextBox 5">
+            <a:extLst>
+              <a:ext uri="{FF2B5EF4-FFF2-40B4-BE49-F238E27FC236}">
+                <a16:creationId xmlns:a16="http://schemas.microsoft.com/office/drawing/2014/main" id="{712AC8CF-13A3-4593-9053-122027377F90}"/>
+              </a:ext>
+            </a:extLst>
+          </p:cNvPr>
+          <p:cNvSpPr txBox="1"/>
+          <p:nvPr/>
+        </p:nvSpPr>
+        <p:spPr>
+          <a:xfrm>
+            <a:off x="226503" y="167780"/>
+            <a:ext cx="1316386" cy="646331"/>
+          </a:xfrm>
+          <a:prstGeom prst="rect">
+            <a:avLst/>
+          </a:prstGeom>
+          <a:noFill/>
+        </p:spPr>
+        <p:txBody>
+          <a:bodyPr wrap="none" rtlCol="0">
+            <a:spAutoFit/>
+          </a:bodyPr>
+          <a:lstStyle/>
+          <a:p>
+            <a:r>
+              <a:rPr lang="en-US" sz="3600" b="1" dirty="0"/>
+              <a:t>Lab 2</a:t>
+            </a:r>
+          </a:p>
+        </p:txBody>
+      </p:sp>
+      <p:sp>
+        <p:nvSpPr>
+          <p:cNvPr id="8" name="Rectangle 7">
+            <a:extLst>
+              <a:ext uri="{FF2B5EF4-FFF2-40B4-BE49-F238E27FC236}">
+                <a16:creationId xmlns:a16="http://schemas.microsoft.com/office/drawing/2014/main" id="{D4F18F7E-6B87-4776-849F-EB88CF60DA92}"/>
+              </a:ext>
+            </a:extLst>
+          </p:cNvPr>
+          <p:cNvSpPr/>
+          <p:nvPr/>
+        </p:nvSpPr>
+        <p:spPr>
+          <a:xfrm>
+            <a:off x="427838" y="814111"/>
+            <a:ext cx="11107023" cy="2246769"/>
+          </a:xfrm>
+          <a:prstGeom prst="rect">
+            <a:avLst/>
+          </a:prstGeom>
+        </p:spPr>
+        <p:txBody>
+          <a:bodyPr wrap="square">
+            <a:spAutoFit/>
+          </a:bodyPr>
+          <a:lstStyle/>
+          <a:p>
+            <a:r>
+              <a:rPr lang="en-US" sz="2800" dirty="0"/>
+              <a:t>Mapping reported crime in Spokane, WA</a:t>
+            </a:r>
+          </a:p>
+          <a:p>
+            <a:pPr marL="457200" indent="-457200">
+              <a:buFont typeface="Arial" panose="020B0604020202020204" pitchFamily="34" charset="0"/>
+              <a:buChar char="•"/>
+            </a:pPr>
+            <a:r>
+              <a:rPr lang="en-US" sz="2800" dirty="0"/>
+              <a:t>Mean centers by type of offense</a:t>
+            </a:r>
+          </a:p>
+          <a:p>
+            <a:pPr marL="457200" indent="-457200">
+              <a:buFont typeface="Arial" panose="020B0604020202020204" pitchFamily="34" charset="0"/>
+              <a:buChar char="•"/>
+            </a:pPr>
+            <a:r>
+              <a:rPr lang="en-US" sz="2800" dirty="0"/>
+              <a:t>Calculating crime rates by precinct</a:t>
+            </a:r>
+          </a:p>
+          <a:p>
+            <a:pPr marL="457200" indent="-457200">
+              <a:buFont typeface="Arial" panose="020B0604020202020204" pitchFamily="34" charset="0"/>
+              <a:buChar char="•"/>
+            </a:pPr>
+            <a:r>
+              <a:rPr lang="en-US" sz="2800" dirty="0"/>
+              <a:t>Calculating the LQ for burglaries</a:t>
+            </a:r>
+          </a:p>
+          <a:p>
+            <a:pPr marL="457200" indent="-457200">
+              <a:buFont typeface="Arial" panose="020B0604020202020204" pitchFamily="34" charset="0"/>
+              <a:buChar char="•"/>
+            </a:pPr>
+            <a:r>
+              <a:rPr lang="en-US" sz="2800" dirty="0"/>
+              <a:t>Bonus: Creating a quadrat map</a:t>
+            </a:r>
+          </a:p>
+        </p:txBody>
+      </p:sp>
+      <p:pic>
+        <p:nvPicPr>
+          <p:cNvPr id="2" name="Picture 1">
+            <a:extLst>
+              <a:ext uri="{FF2B5EF4-FFF2-40B4-BE49-F238E27FC236}">
+                <a16:creationId xmlns:a16="http://schemas.microsoft.com/office/drawing/2014/main" id="{1F217B2B-43D1-4679-A463-133A7F3EF8EA}"/>
+              </a:ext>
+            </a:extLst>
+          </p:cNvPr>
+          <p:cNvPicPr>
+            <a:picLocks noChangeAspect="1"/>
+          </p:cNvPicPr>
+          <p:nvPr/>
+        </p:nvPicPr>
+        <p:blipFill rotWithShape="1">
+          <a:blip r:embed="rId2"/>
+          <a:srcRect l="23364" r="22273"/>
+          <a:stretch/>
+        </p:blipFill>
+        <p:spPr>
+          <a:xfrm>
+            <a:off x="7502554" y="608032"/>
+            <a:ext cx="4462943" cy="5123809"/>
+          </a:xfrm>
+          <a:prstGeom prst="rect">
+            <a:avLst/>
+          </a:prstGeom>
+        </p:spPr>
+      </p:pic>
+    </p:spTree>
+    <p:extLst>
+      <p:ext uri="{BB962C8B-B14F-4D97-AF65-F5344CB8AC3E}">
+        <p14:creationId xmlns:p14="http://schemas.microsoft.com/office/powerpoint/2010/main" val="2457507945"/>
+      </p:ext>
+    </p:extLst>
+  </p:cSld>
+  <p:clrMapOvr>
+    <a:masterClrMapping/>
+  </p:clrMapOvr>
+</p:sld>
+</file>
+
 <file path=ppt/slides/slide2.xml><?xml version="1.0" encoding="utf-8"?>
 <p:sld xmlns:a="http://schemas.openxmlformats.org/drawingml/2006/main" xmlns:r="http://schemas.openxmlformats.org/officeDocument/2006/relationships" xmlns:p="http://schemas.openxmlformats.org/presentationml/2006/main">
   <p:cSld>
@@ -6923,7 +7092,7 @@
         <p:spPr>
           <a:xfrm>
             <a:off x="226503" y="167780"/>
-            <a:ext cx="2050561" cy="646331"/>
+            <a:ext cx="5477782" cy="646331"/>
           </a:xfrm>
           <a:prstGeom prst="rect">
             <a:avLst/>
@@ -6938,59 +7107,17 @@
           <a:p>
             <a:r>
               <a:rPr lang="en-US" sz="3600" b="1" dirty="0"/>
-              <a:t>Quadrats</a:t>
-            </a:r>
-          </a:p>
-        </p:txBody>
-      </p:sp>
-      <p:sp>
-        <p:nvSpPr>
-          <p:cNvPr id="8" name="Rectangle 7">
+              <a:t>Nearest Neighbor Index</a:t>
+            </a:r>
+          </a:p>
+        </p:txBody>
+      </p:sp>
+      <p:pic>
+        <p:nvPicPr>
+          <p:cNvPr id="3" name="Shape 99" descr="Regular Distribution of Points">
             <a:extLst>
               <a:ext uri="{FF2B5EF4-FFF2-40B4-BE49-F238E27FC236}">
-                <a16:creationId xmlns:a16="http://schemas.microsoft.com/office/drawing/2014/main" id="{D4F18F7E-6B87-4776-849F-EB88CF60DA92}"/>
-              </a:ext>
-            </a:extLst>
-          </p:cNvPr>
-          <p:cNvSpPr/>
-          <p:nvPr/>
-        </p:nvSpPr>
-        <p:spPr>
-          <a:xfrm>
-            <a:off x="494951" y="1096753"/>
-            <a:ext cx="5838737" cy="954107"/>
-          </a:xfrm>
-          <a:prstGeom prst="rect">
-            <a:avLst/>
-          </a:prstGeom>
-        </p:spPr>
-        <p:txBody>
-          <a:bodyPr wrap="square">
-            <a:spAutoFit/>
-          </a:bodyPr>
-          <a:lstStyle/>
-          <a:p>
-            <a:r>
-              <a:rPr lang="en-US" sz="2800" dirty="0"/>
-              <a:t>Aggregating points to a </a:t>
-            </a:r>
-            <a:r>
-              <a:rPr lang="en-US" sz="2800" dirty="0" err="1"/>
-              <a:t>tessalated</a:t>
-            </a:r>
-            <a:r>
-              <a:rPr lang="en-US" sz="2800" dirty="0"/>
-              <a:t> grid, usually squares or hexagons</a:t>
-            </a:r>
-          </a:p>
-        </p:txBody>
-      </p:sp>
-      <p:pic>
-        <p:nvPicPr>
-          <p:cNvPr id="14" name="Shape 199" descr="i3">
-            <a:extLst>
-              <a:ext uri="{FF2B5EF4-FFF2-40B4-BE49-F238E27FC236}">
-                <a16:creationId xmlns:a16="http://schemas.microsoft.com/office/drawing/2014/main" id="{FC80FBA8-D3FC-426D-9DC4-E410117591C0}"/>
+                <a16:creationId xmlns:a16="http://schemas.microsoft.com/office/drawing/2014/main" id="{399FC99A-4825-4BE9-91B5-A6C00CBE8A6D}"/>
               </a:ext>
             </a:extLst>
           </p:cNvPr>
@@ -7006,8 +7133,8 @@
         </p:blipFill>
         <p:spPr>
           <a:xfrm>
-            <a:off x="7097086" y="650671"/>
-            <a:ext cx="4868411" cy="4832092"/>
+            <a:off x="4102217" y="3892492"/>
+            <a:ext cx="3644315" cy="2498766"/>
           </a:xfrm>
           <a:prstGeom prst="rect">
             <a:avLst/>
@@ -7020,51 +7147,244 @@
       </p:pic>
       <p:pic>
         <p:nvPicPr>
-          <p:cNvPr id="15" name="Picture 2" descr="Image result for quadrats gis">
+          <p:cNvPr id="4" name="Shape 100" descr="Random Distribution of Points">
             <a:extLst>
               <a:ext uri="{FF2B5EF4-FFF2-40B4-BE49-F238E27FC236}">
-                <a16:creationId xmlns:a16="http://schemas.microsoft.com/office/drawing/2014/main" id="{D9AE83B5-D7F8-4294-B5F4-F7C26E7C43CB}"/>
+                <a16:creationId xmlns:a16="http://schemas.microsoft.com/office/drawing/2014/main" id="{F0F2D7D7-6779-4D36-B647-4F1CDA336AAB}"/>
               </a:ext>
             </a:extLst>
           </p:cNvPr>
-          <p:cNvPicPr>
-            <a:picLocks noChangeAspect="1" noChangeArrowheads="1"/>
-          </p:cNvPicPr>
+          <p:cNvPicPr preferRelativeResize="0"/>
           <p:nvPr/>
         </p:nvPicPr>
-        <p:blipFill>
+        <p:blipFill rotWithShape="1">
           <a:blip r:embed="rId3">
-            <a:extLst>
-              <a:ext uri="{28A0092B-C50C-407E-A947-70E740481C1C}">
-                <a14:useLocalDpi xmlns:a14="http://schemas.microsoft.com/office/drawing/2010/main" val="0"/>
-              </a:ext>
-            </a:extLst>
+            <a:alphaModFix/>
           </a:blip>
           <a:srcRect/>
-          <a:stretch>
-            <a:fillRect/>
-          </a:stretch>
+          <a:stretch/>
         </p:blipFill>
-        <p:spPr bwMode="auto">
-          <a:xfrm>
-            <a:off x="1899353" y="2333502"/>
-            <a:ext cx="4294841" cy="4294841"/>
+        <p:spPr>
+          <a:xfrm>
+            <a:off x="226503" y="3892492"/>
+            <a:ext cx="3496811" cy="2498765"/>
           </a:xfrm>
           <a:prstGeom prst="rect">
             <a:avLst/>
           </a:prstGeom>
           <a:noFill/>
-          <a:extLst>
-            <a:ext uri="{909E8E84-426E-40DD-AFC4-6F175D3DCCD1}">
-              <a14:hiddenFill xmlns:a14="http://schemas.microsoft.com/office/drawing/2010/main">
-                <a:solidFill>
-                  <a:srgbClr val="FFFFFF"/>
-                </a:solidFill>
-              </a14:hiddenFill>
-            </a:ext>
-          </a:extLst>
+          <a:ln>
+            <a:noFill/>
+          </a:ln>
         </p:spPr>
       </p:pic>
+      <p:pic>
+        <p:nvPicPr>
+          <p:cNvPr id="5" name="Shape 101" descr="Clustered Distribution of Points">
+            <a:extLst>
+              <a:ext uri="{FF2B5EF4-FFF2-40B4-BE49-F238E27FC236}">
+                <a16:creationId xmlns:a16="http://schemas.microsoft.com/office/drawing/2014/main" id="{42A03B3E-3D01-465D-98B2-69F74F617363}"/>
+              </a:ext>
+            </a:extLst>
+          </p:cNvPr>
+          <p:cNvPicPr preferRelativeResize="0"/>
+          <p:nvPr/>
+        </p:nvPicPr>
+        <p:blipFill rotWithShape="1">
+          <a:blip r:embed="rId4">
+            <a:alphaModFix/>
+          </a:blip>
+          <a:srcRect/>
+          <a:stretch/>
+        </p:blipFill>
+        <p:spPr>
+          <a:xfrm>
+            <a:off x="7986319" y="3892492"/>
+            <a:ext cx="3772949" cy="2498766"/>
+          </a:xfrm>
+          <a:prstGeom prst="rect">
+            <a:avLst/>
+          </a:prstGeom>
+          <a:noFill/>
+          <a:ln>
+            <a:noFill/>
+          </a:ln>
+        </p:spPr>
+      </p:pic>
+      <mc:AlternateContent xmlns:mc="http://schemas.openxmlformats.org/markup-compatibility/2006">
+        <mc:Choice xmlns:a14="http://schemas.microsoft.com/office/drawing/2010/main" Requires="a14">
+          <p:sp>
+            <p:nvSpPr>
+              <p:cNvPr id="2" name="TextBox 1">
+                <a:extLst>
+                  <a:ext uri="{FF2B5EF4-FFF2-40B4-BE49-F238E27FC236}">
+                    <a16:creationId xmlns:a16="http://schemas.microsoft.com/office/drawing/2014/main" id="{27994403-C985-4737-B908-BDCB5C061047}"/>
+                  </a:ext>
+                </a:extLst>
+              </p:cNvPr>
+              <p:cNvSpPr txBox="1"/>
+              <p:nvPr/>
+            </p:nvSpPr>
+            <p:spPr>
+              <a:xfrm>
+                <a:off x="2514506" y="1456002"/>
+                <a:ext cx="7162987" cy="1148969"/>
+              </a:xfrm>
+              <a:prstGeom prst="rect">
+                <a:avLst/>
+              </a:prstGeom>
+              <a:noFill/>
+            </p:spPr>
+            <p:txBody>
+              <a:bodyPr wrap="none" lIns="0" tIns="0" rIns="0" bIns="0" rtlCol="0">
+                <a:spAutoFit/>
+              </a:bodyPr>
+              <a:lstStyle/>
+              <a:p>
+                <a14:m>
+                  <m:oMathPara xmlns:m="http://schemas.openxmlformats.org/officeDocument/2006/math">
+                    <m:oMathParaPr>
+                      <m:jc m:val="centerGroup"/>
+                    </m:oMathParaPr>
+                    <m:oMath xmlns:m="http://schemas.openxmlformats.org/officeDocument/2006/math">
+                      <m:f>
+                        <m:fPr>
+                          <m:ctrlPr>
+                            <a:rPr lang="en-US" sz="3600" i="1" smtClean="0">
+                              <a:latin typeface="Cambria Math" panose="02040503050406030204" pitchFamily="18" charset="0"/>
+                            </a:rPr>
+                          </m:ctrlPr>
+                        </m:fPr>
+                        <m:num>
+                          <m:r>
+                            <a:rPr lang="en-US" sz="3600" b="0" i="1" smtClean="0">
+                              <a:latin typeface="Cambria Math" panose="02040503050406030204" pitchFamily="18" charset="0"/>
+                            </a:rPr>
+                            <m:t>𝐴𝑐𝑡𝑢𝑎𝑙</m:t>
+                          </m:r>
+                          <m:r>
+                            <a:rPr lang="en-US" sz="3600" b="0" i="1" smtClean="0">
+                              <a:latin typeface="Cambria Math" panose="02040503050406030204" pitchFamily="18" charset="0"/>
+                            </a:rPr>
+                            <m:t> </m:t>
+                          </m:r>
+                          <m:r>
+                            <a:rPr lang="en-US" sz="3600" b="0" i="1" smtClean="0">
+                              <a:latin typeface="Cambria Math" panose="02040503050406030204" pitchFamily="18" charset="0"/>
+                            </a:rPr>
+                            <m:t>𝑎𝑣𝑒𝑟𝑎𝑔𝑒</m:t>
+                          </m:r>
+                          <m:r>
+                            <a:rPr lang="en-US" sz="3600" b="0" i="1" smtClean="0">
+                              <a:latin typeface="Cambria Math" panose="02040503050406030204" pitchFamily="18" charset="0"/>
+                            </a:rPr>
+                            <m:t> </m:t>
+                          </m:r>
+                          <m:r>
+                            <a:rPr lang="en-US" sz="3600" b="0" i="1" smtClean="0">
+                              <a:latin typeface="Cambria Math" panose="02040503050406030204" pitchFamily="18" charset="0"/>
+                            </a:rPr>
+                            <m:t>𝑑𝑖𝑠𝑡𝑎𝑛𝑐𝑒</m:t>
+                          </m:r>
+                        </m:num>
+                        <m:den>
+                          <m:r>
+                            <a:rPr lang="en-US" sz="3600" b="0" i="1" smtClean="0">
+                              <a:latin typeface="Cambria Math" panose="02040503050406030204" pitchFamily="18" charset="0"/>
+                            </a:rPr>
+                            <m:t>𝐷𝑖𝑠𝑡𝑎𝑛𝑐𝑒</m:t>
+                          </m:r>
+                          <m:r>
+                            <a:rPr lang="en-US" sz="3600" b="0" i="1" smtClean="0">
+                              <a:latin typeface="Cambria Math" panose="02040503050406030204" pitchFamily="18" charset="0"/>
+                            </a:rPr>
+                            <m:t> </m:t>
+                          </m:r>
+                          <m:r>
+                            <a:rPr lang="en-US" sz="3600" b="0" i="1" smtClean="0">
+                              <a:latin typeface="Cambria Math" panose="02040503050406030204" pitchFamily="18" charset="0"/>
+                            </a:rPr>
+                            <m:t>𝑓𝑜𝑟</m:t>
+                          </m:r>
+                          <m:r>
+                            <a:rPr lang="en-US" sz="3600" b="0" i="1" smtClean="0">
+                              <a:latin typeface="Cambria Math" panose="02040503050406030204" pitchFamily="18" charset="0"/>
+                            </a:rPr>
+                            <m:t> </m:t>
+                          </m:r>
+                          <m:r>
+                            <a:rPr lang="en-US" sz="3600" b="0" i="1" smtClean="0">
+                              <a:latin typeface="Cambria Math" panose="02040503050406030204" pitchFamily="18" charset="0"/>
+                            </a:rPr>
+                            <m:t>𝑟𝑎𝑛𝑑𝑜𝑚</m:t>
+                          </m:r>
+                          <m:r>
+                            <a:rPr lang="en-US" sz="3600" b="0" i="1" smtClean="0">
+                              <a:latin typeface="Cambria Math" panose="02040503050406030204" pitchFamily="18" charset="0"/>
+                            </a:rPr>
+                            <m:t> </m:t>
+                          </m:r>
+                          <m:r>
+                            <a:rPr lang="en-US" sz="3600" b="0" i="1" smtClean="0">
+                              <a:latin typeface="Cambria Math" panose="02040503050406030204" pitchFamily="18" charset="0"/>
+                            </a:rPr>
+                            <m:t>𝑑𝑖𝑠𝑡𝑟𝑖𝑏𝑢𝑡𝑖𝑜𝑛</m:t>
+                          </m:r>
+                        </m:den>
+                      </m:f>
+                    </m:oMath>
+                  </m:oMathPara>
+                </a14:m>
+                <a:endParaRPr lang="en-US" sz="3600" dirty="0"/>
+              </a:p>
+            </p:txBody>
+          </p:sp>
+        </mc:Choice>
+        <mc:Fallback>
+          <p:sp>
+            <p:nvSpPr>
+              <p:cNvPr id="2" name="TextBox 1">
+                <a:extLst>
+                  <a:ext uri="{FF2B5EF4-FFF2-40B4-BE49-F238E27FC236}">
+                    <a16:creationId xmlns:a16="http://schemas.microsoft.com/office/drawing/2014/main" id="{27994403-C985-4737-B908-BDCB5C061047}"/>
+                  </a:ext>
+                </a:extLst>
+              </p:cNvPr>
+              <p:cNvSpPr txBox="1">
+                <a:spLocks noRot="1" noChangeAspect="1" noMove="1" noResize="1" noEditPoints="1" noAdjustHandles="1" noChangeArrowheads="1" noChangeShapeType="1" noTextEdit="1"/>
+              </p:cNvSpPr>
+              <p:nvPr/>
+            </p:nvSpPr>
+            <p:spPr>
+              <a:xfrm>
+                <a:off x="2514506" y="1456002"/>
+                <a:ext cx="7162987" cy="1148969"/>
+              </a:xfrm>
+              <a:prstGeom prst="rect">
+                <a:avLst/>
+              </a:prstGeom>
+              <a:blipFill>
+                <a:blip r:embed="rId5"/>
+                <a:stretch>
+                  <a:fillRect/>
+                </a:stretch>
+              </a:blipFill>
+            </p:spPr>
+            <p:txBody>
+              <a:bodyPr/>
+              <a:lstStyle/>
+              <a:p>
+                <a:r>
+                  <a:rPr lang="en-US">
+                    <a:noFill/>
+                  </a:rPr>
+                  <a:t> </a:t>
+                </a:r>
+              </a:p>
+            </p:txBody>
+          </p:sp>
+        </mc:Fallback>
+      </mc:AlternateContent>
     </p:spTree>
     <p:extLst>
       <p:ext uri="{BB962C8B-B14F-4D97-AF65-F5344CB8AC3E}">
@@ -7110,7 +7430,7 @@
         <p:spPr>
           <a:xfrm>
             <a:off x="226503" y="167780"/>
-            <a:ext cx="2463623" cy="646331"/>
+            <a:ext cx="2050561" cy="646331"/>
           </a:xfrm>
           <a:prstGeom prst="rect">
             <a:avLst/>
@@ -7125,7 +7445,7 @@
           <a:p>
             <a:r>
               <a:rPr lang="en-US" sz="3600" b="1" dirty="0"/>
-              <a:t>Let’s try it!</a:t>
+              <a:t>Quadrats</a:t>
             </a:r>
           </a:p>
         </p:txBody>
@@ -7144,8 +7464,8 @@
         </p:nvSpPr>
         <p:spPr>
           <a:xfrm>
-            <a:off x="427839" y="814111"/>
-            <a:ext cx="8774884" cy="1384995"/>
+            <a:off x="494951" y="1096753"/>
+            <a:ext cx="5838737" cy="954107"/>
           </a:xfrm>
           <a:prstGeom prst="rect">
             <a:avLst/>
@@ -7159,27 +7479,206 @@
           <a:p>
             <a:r>
               <a:rPr lang="en-US" sz="2800" dirty="0"/>
+              <a:t>Aggregating points to a </a:t>
+            </a:r>
+            <a:r>
+              <a:rPr lang="en-US" sz="2800" dirty="0" err="1"/>
+              <a:t>tessalated</a:t>
+            </a:r>
+            <a:r>
+              <a:rPr lang="en-US" sz="2800" dirty="0"/>
+              <a:t> grid, usually squares or hexagons</a:t>
+            </a:r>
+          </a:p>
+        </p:txBody>
+      </p:sp>
+      <p:pic>
+        <p:nvPicPr>
+          <p:cNvPr id="14" name="Shape 199" descr="i3">
+            <a:extLst>
+              <a:ext uri="{FF2B5EF4-FFF2-40B4-BE49-F238E27FC236}">
+                <a16:creationId xmlns:a16="http://schemas.microsoft.com/office/drawing/2014/main" id="{FC80FBA8-D3FC-426D-9DC4-E410117591C0}"/>
+              </a:ext>
+            </a:extLst>
+          </p:cNvPr>
+          <p:cNvPicPr preferRelativeResize="0"/>
+          <p:nvPr/>
+        </p:nvPicPr>
+        <p:blipFill rotWithShape="1">
+          <a:blip r:embed="rId2">
+            <a:alphaModFix/>
+          </a:blip>
+          <a:srcRect/>
+          <a:stretch/>
+        </p:blipFill>
+        <p:spPr>
+          <a:xfrm>
+            <a:off x="7097086" y="650671"/>
+            <a:ext cx="4868411" cy="4832092"/>
+          </a:xfrm>
+          <a:prstGeom prst="rect">
+            <a:avLst/>
+          </a:prstGeom>
+          <a:noFill/>
+          <a:ln>
+            <a:noFill/>
+          </a:ln>
+        </p:spPr>
+      </p:pic>
+      <p:pic>
+        <p:nvPicPr>
+          <p:cNvPr id="15" name="Picture 2" descr="Image result for quadrats gis">
+            <a:extLst>
+              <a:ext uri="{FF2B5EF4-FFF2-40B4-BE49-F238E27FC236}">
+                <a16:creationId xmlns:a16="http://schemas.microsoft.com/office/drawing/2014/main" id="{D9AE83B5-D7F8-4294-B5F4-F7C26E7C43CB}"/>
+              </a:ext>
+            </a:extLst>
+          </p:cNvPr>
+          <p:cNvPicPr>
+            <a:picLocks noChangeAspect="1" noChangeArrowheads="1"/>
+          </p:cNvPicPr>
+          <p:nvPr/>
+        </p:nvPicPr>
+        <p:blipFill>
+          <a:blip r:embed="rId3">
+            <a:extLst>
+              <a:ext uri="{28A0092B-C50C-407E-A947-70E740481C1C}">
+                <a14:useLocalDpi xmlns:a14="http://schemas.microsoft.com/office/drawing/2010/main" val="0"/>
+              </a:ext>
+            </a:extLst>
+          </a:blip>
+          <a:srcRect/>
+          <a:stretch>
+            <a:fillRect/>
+          </a:stretch>
+        </p:blipFill>
+        <p:spPr bwMode="auto">
+          <a:xfrm>
+            <a:off x="1899353" y="2333502"/>
+            <a:ext cx="4294841" cy="4294841"/>
+          </a:xfrm>
+          <a:prstGeom prst="rect">
+            <a:avLst/>
+          </a:prstGeom>
+          <a:noFill/>
+          <a:extLst>
+            <a:ext uri="{909E8E84-426E-40DD-AFC4-6F175D3DCCD1}">
+              <a14:hiddenFill xmlns:a14="http://schemas.microsoft.com/office/drawing/2010/main">
+                <a:solidFill>
+                  <a:srgbClr val="FFFFFF"/>
+                </a:solidFill>
+              </a14:hiddenFill>
+            </a:ext>
+          </a:extLst>
+        </p:spPr>
+      </p:pic>
+    </p:spTree>
+    <p:extLst>
+      <p:ext uri="{BB962C8B-B14F-4D97-AF65-F5344CB8AC3E}">
+        <p14:creationId xmlns:p14="http://schemas.microsoft.com/office/powerpoint/2010/main" val="2923850629"/>
+      </p:ext>
+    </p:extLst>
+  </p:cSld>
+  <p:clrMapOvr>
+    <a:masterClrMapping/>
+  </p:clrMapOvr>
+</p:sld>
+</file>
+
+<file path=ppt/slides/slide6.xml><?xml version="1.0" encoding="utf-8"?>
+<p:sld xmlns:a="http://schemas.openxmlformats.org/drawingml/2006/main" xmlns:r="http://schemas.openxmlformats.org/officeDocument/2006/relationships" xmlns:p="http://schemas.openxmlformats.org/presentationml/2006/main">
+  <p:cSld>
+    <p:spTree>
+      <p:nvGrpSpPr>
+        <p:cNvPr id="1" name=""/>
+        <p:cNvGrpSpPr/>
+        <p:nvPr/>
+      </p:nvGrpSpPr>
+      <p:grpSpPr>
+        <a:xfrm>
+          <a:off x="0" y="0"/>
+          <a:ext cx="0" cy="0"/>
+          <a:chOff x="0" y="0"/>
+          <a:chExt cx="0" cy="0"/>
+        </a:xfrm>
+      </p:grpSpPr>
+      <p:sp>
+        <p:nvSpPr>
+          <p:cNvPr id="6" name="TextBox 5">
+            <a:extLst>
+              <a:ext uri="{FF2B5EF4-FFF2-40B4-BE49-F238E27FC236}">
+                <a16:creationId xmlns:a16="http://schemas.microsoft.com/office/drawing/2014/main" id="{712AC8CF-13A3-4593-9053-122027377F90}"/>
+              </a:ext>
+            </a:extLst>
+          </p:cNvPr>
+          <p:cNvSpPr txBox="1"/>
+          <p:nvPr/>
+        </p:nvSpPr>
+        <p:spPr>
+          <a:xfrm>
+            <a:off x="226503" y="167780"/>
+            <a:ext cx="2463623" cy="646331"/>
+          </a:xfrm>
+          <a:prstGeom prst="rect">
+            <a:avLst/>
+          </a:prstGeom>
+          <a:noFill/>
+        </p:spPr>
+        <p:txBody>
+          <a:bodyPr wrap="none" rtlCol="0">
+            <a:spAutoFit/>
+          </a:bodyPr>
+          <a:lstStyle/>
+          <a:p>
+            <a:r>
+              <a:rPr lang="en-US" sz="3600" b="1" dirty="0"/>
+              <a:t>Let’s try it!</a:t>
+            </a:r>
+          </a:p>
+        </p:txBody>
+      </p:sp>
+      <p:sp>
+        <p:nvSpPr>
+          <p:cNvPr id="8" name="Rectangle 7">
+            <a:extLst>
+              <a:ext uri="{FF2B5EF4-FFF2-40B4-BE49-F238E27FC236}">
+                <a16:creationId xmlns:a16="http://schemas.microsoft.com/office/drawing/2014/main" id="{D4F18F7E-6B87-4776-849F-EB88CF60DA92}"/>
+              </a:ext>
+            </a:extLst>
+          </p:cNvPr>
+          <p:cNvSpPr/>
+          <p:nvPr/>
+        </p:nvSpPr>
+        <p:spPr>
+          <a:xfrm>
+            <a:off x="427838" y="814111"/>
+            <a:ext cx="10578517" cy="1384995"/>
+          </a:xfrm>
+          <a:prstGeom prst="rect">
+            <a:avLst/>
+          </a:prstGeom>
+        </p:spPr>
+        <p:txBody>
+          <a:bodyPr wrap="square">
+            <a:spAutoFit/>
+          </a:bodyPr>
+          <a:lstStyle/>
+          <a:p>
+            <a:r>
+              <a:rPr lang="en-US" sz="2800" dirty="0"/>
               <a:t>Dollar stores in Atlanta</a:t>
             </a:r>
           </a:p>
           <a:p>
             <a:r>
               <a:rPr lang="en-US" sz="2800" dirty="0"/>
-              <a:t>Create a quadrat grid of 1, 1.5, or 2 inch squares</a:t>
+              <a:t>Create a quadrat grid of 1.5 or 3 inch squares</a:t>
             </a:r>
           </a:p>
           <a:p>
             <a:r>
               <a:rPr lang="en-US" sz="2800" dirty="0"/>
-              <a:t>Count the total of </a:t>
-            </a:r>
-            <a:r>
-              <a:rPr lang="en-US" sz="2800" u="sng" dirty="0"/>
-              <a:t>all</a:t>
-            </a:r>
-            <a:r>
-              <a:rPr lang="en-US" sz="2800" dirty="0"/>
-              <a:t> stores in each grid cell</a:t>
+              <a:t>Count the total of all stores in each grid cell</a:t>
             </a:r>
           </a:p>
         </p:txBody>
@@ -7233,7 +7732,7 @@
 </p:sld>
 </file>
 
-<file path=ppt/slides/slide6.xml><?xml version="1.0" encoding="utf-8"?>
+<file path=ppt/slides/slide7.xml><?xml version="1.0" encoding="utf-8"?>
 <p:sld xmlns:a="http://schemas.openxmlformats.org/drawingml/2006/main" xmlns:r="http://schemas.openxmlformats.org/officeDocument/2006/relationships" xmlns:p="http://schemas.openxmlformats.org/presentationml/2006/main">
   <p:cSld>
     <p:spTree>
@@ -7599,7 +8098,7 @@
 </p:sld>
 </file>
 
-<file path=ppt/slides/slide7.xml><?xml version="1.0" encoding="utf-8"?>
+<file path=ppt/slides/slide8.xml><?xml version="1.0" encoding="utf-8"?>
 <p:sld xmlns:a="http://schemas.openxmlformats.org/drawingml/2006/main" xmlns:r="http://schemas.openxmlformats.org/officeDocument/2006/relationships" xmlns:p="http://schemas.openxmlformats.org/presentationml/2006/main">
   <p:cSld>
     <p:spTree>
@@ -7731,7 +8230,7 @@
 </p:sld>
 </file>
 
-<file path=ppt/slides/slide8.xml><?xml version="1.0" encoding="utf-8"?>
+<file path=ppt/slides/slide9.xml><?xml version="1.0" encoding="utf-8"?>
 <p:sld xmlns:a="http://schemas.openxmlformats.org/drawingml/2006/main" xmlns:r="http://schemas.openxmlformats.org/officeDocument/2006/relationships" xmlns:p="http://schemas.openxmlformats.org/presentationml/2006/main">
   <p:cSld>
     <p:spTree>
@@ -7826,7 +8325,7 @@
             </a:r>
             <a:r>
               <a:rPr lang="en-US" sz="2800" dirty="0"/>
-              <a:t> CSV file on Github</a:t>
+              <a:t> CSV file in the class repo</a:t>
             </a:r>
           </a:p>
           <a:p>
@@ -7883,174 +8382,6 @@
     <p:extLst>
       <p:ext uri="{BB962C8B-B14F-4D97-AF65-F5344CB8AC3E}">
         <p14:creationId xmlns:p14="http://schemas.microsoft.com/office/powerpoint/2010/main" val="2309717882"/>
-      </p:ext>
-    </p:extLst>
-  </p:cSld>
-  <p:clrMapOvr>
-    <a:masterClrMapping/>
-  </p:clrMapOvr>
-</p:sld>
-</file>
-
-<file path=ppt/slides/slide9.xml><?xml version="1.0" encoding="utf-8"?>
-<p:sld xmlns:a="http://schemas.openxmlformats.org/drawingml/2006/main" xmlns:r="http://schemas.openxmlformats.org/officeDocument/2006/relationships" xmlns:p="http://schemas.openxmlformats.org/presentationml/2006/main">
-  <p:cSld>
-    <p:spTree>
-      <p:nvGrpSpPr>
-        <p:cNvPr id="1" name=""/>
-        <p:cNvGrpSpPr/>
-        <p:nvPr/>
-      </p:nvGrpSpPr>
-      <p:grpSpPr>
-        <a:xfrm>
-          <a:off x="0" y="0"/>
-          <a:ext cx="0" cy="0"/>
-          <a:chOff x="0" y="0"/>
-          <a:chExt cx="0" cy="0"/>
-        </a:xfrm>
-      </p:grpSpPr>
-      <p:sp>
-        <p:nvSpPr>
-          <p:cNvPr id="6" name="TextBox 5">
-            <a:extLst>
-              <a:ext uri="{FF2B5EF4-FFF2-40B4-BE49-F238E27FC236}">
-                <a16:creationId xmlns:a16="http://schemas.microsoft.com/office/drawing/2014/main" id="{712AC8CF-13A3-4593-9053-122027377F90}"/>
-              </a:ext>
-            </a:extLst>
-          </p:cNvPr>
-          <p:cNvSpPr txBox="1"/>
-          <p:nvPr/>
-        </p:nvSpPr>
-        <p:spPr>
-          <a:xfrm>
-            <a:off x="226503" y="167780"/>
-            <a:ext cx="1316386" cy="646331"/>
-          </a:xfrm>
-          <a:prstGeom prst="rect">
-            <a:avLst/>
-          </a:prstGeom>
-          <a:noFill/>
-        </p:spPr>
-        <p:txBody>
-          <a:bodyPr wrap="none" rtlCol="0">
-            <a:spAutoFit/>
-          </a:bodyPr>
-          <a:lstStyle/>
-          <a:p>
-            <a:r>
-              <a:rPr lang="en-US" sz="3600" b="1" dirty="0"/>
-              <a:t>Lab 2</a:t>
-            </a:r>
-          </a:p>
-        </p:txBody>
-      </p:sp>
-      <p:sp>
-        <p:nvSpPr>
-          <p:cNvPr id="8" name="Rectangle 7">
-            <a:extLst>
-              <a:ext uri="{FF2B5EF4-FFF2-40B4-BE49-F238E27FC236}">
-                <a16:creationId xmlns:a16="http://schemas.microsoft.com/office/drawing/2014/main" id="{D4F18F7E-6B87-4776-849F-EB88CF60DA92}"/>
-              </a:ext>
-            </a:extLst>
-          </p:cNvPr>
-          <p:cNvSpPr/>
-          <p:nvPr/>
-        </p:nvSpPr>
-        <p:spPr>
-          <a:xfrm>
-            <a:off x="427838" y="814111"/>
-            <a:ext cx="11107023" cy="2246769"/>
-          </a:xfrm>
-          <a:prstGeom prst="rect">
-            <a:avLst/>
-          </a:prstGeom>
-        </p:spPr>
-        <p:txBody>
-          <a:bodyPr wrap="square">
-            <a:spAutoFit/>
-          </a:bodyPr>
-          <a:lstStyle/>
-          <a:p>
-            <a:r>
-              <a:rPr lang="en-US" sz="2800" dirty="0"/>
-              <a:t>Mapping reported crime in Spokane, WA</a:t>
-            </a:r>
-          </a:p>
-          <a:p>
-            <a:pPr marL="457200" indent="-457200">
-              <a:buFont typeface="Arial" panose="020B0604020202020204" pitchFamily="34" charset="0"/>
-              <a:buChar char="•"/>
-            </a:pPr>
-            <a:r>
-              <a:rPr lang="en-US" sz="2800" dirty="0"/>
-              <a:t>Mean centers by type of offense</a:t>
-            </a:r>
-          </a:p>
-          <a:p>
-            <a:pPr marL="457200" indent="-457200">
-              <a:buFont typeface="Arial" panose="020B0604020202020204" pitchFamily="34" charset="0"/>
-              <a:buChar char="•"/>
-            </a:pPr>
-            <a:r>
-              <a:rPr lang="en-US" sz="2800" dirty="0"/>
-              <a:t>Calculating crime rates by precinct</a:t>
-            </a:r>
-          </a:p>
-          <a:p>
-            <a:pPr marL="457200" indent="-457200">
-              <a:buFont typeface="Arial" panose="020B0604020202020204" pitchFamily="34" charset="0"/>
-              <a:buChar char="•"/>
-            </a:pPr>
-            <a:r>
-              <a:rPr lang="en-US" sz="2800" dirty="0"/>
-              <a:t>Calculating the LQ for burglaries</a:t>
-            </a:r>
-          </a:p>
-          <a:p>
-            <a:pPr marL="457200" indent="-457200">
-              <a:buFont typeface="Arial" panose="020B0604020202020204" pitchFamily="34" charset="0"/>
-              <a:buChar char="•"/>
-            </a:pPr>
-            <a:r>
-              <a:rPr lang="en-US" sz="2800" dirty="0"/>
-              <a:t>Bonus: Creating a quadrat map</a:t>
-            </a:r>
-          </a:p>
-        </p:txBody>
-      </p:sp>
-      <p:pic>
-        <p:nvPicPr>
-          <p:cNvPr id="2" name="Picture 1">
-            <a:extLst>
-              <a:ext uri="{FF2B5EF4-FFF2-40B4-BE49-F238E27FC236}">
-                <a16:creationId xmlns:a16="http://schemas.microsoft.com/office/drawing/2014/main" id="{1F217B2B-43D1-4679-A463-133A7F3EF8EA}"/>
-              </a:ext>
-            </a:extLst>
-          </p:cNvPr>
-          <p:cNvPicPr>
-            <a:picLocks noChangeAspect="1"/>
-          </p:cNvPicPr>
-          <p:nvPr/>
-        </p:nvPicPr>
-        <p:blipFill rotWithShape="1">
-          <a:blip r:embed="rId2"/>
-          <a:srcRect l="23364" r="22273"/>
-          <a:stretch/>
-        </p:blipFill>
-        <p:spPr>
-          <a:xfrm>
-            <a:off x="7502554" y="608032"/>
-            <a:ext cx="4462943" cy="5123809"/>
-          </a:xfrm>
-          <a:prstGeom prst="rect">
-            <a:avLst/>
-          </a:prstGeom>
-        </p:spPr>
-      </p:pic>
-    </p:spTree>
-    <p:extLst>
-      <p:ext uri="{BB962C8B-B14F-4D97-AF65-F5344CB8AC3E}">
-        <p14:creationId xmlns:p14="http://schemas.microsoft.com/office/powerpoint/2010/main" val="2457507945"/>
       </p:ext>
     </p:extLst>
   </p:cSld>

</xml_diff>